<commit_message>
organizing crimeseason code and adding analysis to ppt
</commit_message>
<xml_diff>
--- a/Project 1 Presentation Final.pptx
+++ b/Project 1 Presentation Final.pptx
@@ -46,7 +46,7 @@
       <p:boldItalic r:id="rId29"/>
     </p:embeddedFont>
     <p:embeddedFont>
-      <p:font typeface="Montserrat" panose="00000500000000000000" pitchFamily="2" charset="0"/>
+      <p:font typeface="Montserrat" pitchFamily="2" charset="77"/>
       <p:regular r:id="rId30"/>
       <p:bold r:id="rId31"/>
       <p:italic r:id="rId32"/>
@@ -3355,7 +3355,7 @@
           <a:p>
             <a:fld id="{33444976-0048-7A4B-BDA5-7E235C55B9DD}" type="datetimeFigureOut">
               <a:rPr lang="en-US" smtClean="0"/>
-              <a:t>6/30/2024</a:t>
+              <a:t>6/30/24</a:t>
             </a:fld>
             <a:endParaRPr lang="en-US"/>
           </a:p>
@@ -11152,10 +11152,10 @@
               <a:buNone/>
             </a:pPr>
             <a:r>
-              <a:rPr lang="en"/>
+              <a:rPr lang="en" dirty="0"/>
               <a:t>Resources</a:t>
             </a:r>
-            <a:endParaRPr/>
+            <a:endParaRPr dirty="0"/>
           </a:p>
         </p:txBody>
       </p:sp>
@@ -11194,10 +11194,22 @@
               <a:buNone/>
             </a:pPr>
             <a:r>
-              <a:rPr lang="en"/>
-              <a:t>CSV Source: https://data.austintexas.gov/Public-Safety/Crime-Reports/fdj4-gpfu/about_data</a:t>
+              <a:rPr lang="en" sz="1200" dirty="0"/>
+              <a:t>CSV Source: https://</a:t>
             </a:r>
-            <a:endParaRPr/>
+            <a:r>
+              <a:rPr lang="en" sz="1200" dirty="0" err="1"/>
+              <a:t>data.austintexas.gov</a:t>
+            </a:r>
+            <a:r>
+              <a:rPr lang="en" sz="1200" dirty="0"/>
+              <a:t>/Public-Safety/Crime-Reports/fdj4-gpfu/</a:t>
+            </a:r>
+            <a:r>
+              <a:rPr lang="en" sz="1200" dirty="0" err="1"/>
+              <a:t>about_data</a:t>
+            </a:r>
+            <a:endParaRPr sz="1200" dirty="0"/>
           </a:p>
         </p:txBody>
       </p:sp>
@@ -11261,12 +11273,54 @@
           </a:p>
         </p:txBody>
       </p:sp>
+      <p:sp>
+        <p:nvSpPr>
+          <p:cNvPr id="3" name="TextBox 2">
+            <a:extLst>
+              <a:ext uri="{FF2B5EF4-FFF2-40B4-BE49-F238E27FC236}">
+                <a16:creationId xmlns:a16="http://schemas.microsoft.com/office/drawing/2014/main" id="{162C717E-DE52-8417-2D8B-58CD9762573C}"/>
+              </a:ext>
+            </a:extLst>
+          </p:cNvPr>
+          <p:cNvSpPr txBox="1"/>
+          <p:nvPr/>
+        </p:nvSpPr>
+        <p:spPr>
+          <a:xfrm>
+            <a:off x="506627" y="4698475"/>
+            <a:ext cx="3824578" cy="246221"/>
+          </a:xfrm>
+          <a:prstGeom prst="rect">
+            <a:avLst/>
+          </a:prstGeom>
+          <a:noFill/>
+        </p:spPr>
+        <p:txBody>
+          <a:bodyPr wrap="square" rtlCol="0">
+            <a:spAutoFit/>
+          </a:bodyPr>
+          <a:lstStyle/>
+          <a:p>
+            <a:r>
+              <a:rPr lang="en-US" sz="1000" dirty="0">
+                <a:solidFill>
+                  <a:schemeClr val="bg1"/>
+                </a:solidFill>
+                <a:latin typeface="Lato" panose="020F0502020204030203" pitchFamily="34" charset="0"/>
+                <a:ea typeface="Lato" panose="020F0502020204030203" pitchFamily="34" charset="0"/>
+                <a:cs typeface="Lato" panose="020F0502020204030203" pitchFamily="34" charset="0"/>
+              </a:rPr>
+              <a:t>Has crime gone up or down over the last 20 years in Austin, TX?</a:t>
+            </a:r>
+          </a:p>
+        </p:txBody>
+      </p:sp>
       <p:pic>
         <p:nvPicPr>
-          <p:cNvPr id="4" name="Picture 3">
+          <p:cNvPr id="6" name="Picture 5">
             <a:extLst>
               <a:ext uri="{FF2B5EF4-FFF2-40B4-BE49-F238E27FC236}">
-                <a16:creationId xmlns:a16="http://schemas.microsoft.com/office/drawing/2014/main" id="{92BB3D76-C47E-20A1-8C6D-9FD94837E09C}"/>
+                <a16:creationId xmlns:a16="http://schemas.microsoft.com/office/drawing/2014/main" id="{FE446DAD-BFB8-791B-1D77-EC11CCD8C0F6}"/>
               </a:ext>
             </a:extLst>
           </p:cNvPr>
@@ -11283,8 +11337,8 @@
         </p:blipFill>
         <p:spPr>
           <a:xfrm>
-            <a:off x="380100" y="1268016"/>
-            <a:ext cx="4191901" cy="3367871"/>
+            <a:off x="92691" y="1310565"/>
+            <a:ext cx="4479310" cy="3282773"/>
           </a:xfrm>
           <a:prstGeom prst="rect">
             <a:avLst/>
@@ -11293,10 +11347,10 @@
       </p:pic>
       <p:pic>
         <p:nvPicPr>
-          <p:cNvPr id="7" name="Picture 6">
+          <p:cNvPr id="10" name="Picture 9">
             <a:extLst>
               <a:ext uri="{FF2B5EF4-FFF2-40B4-BE49-F238E27FC236}">
-                <a16:creationId xmlns:a16="http://schemas.microsoft.com/office/drawing/2014/main" id="{E9905F84-323D-6F89-7405-4AABF2751A07}"/>
+                <a16:creationId xmlns:a16="http://schemas.microsoft.com/office/drawing/2014/main" id="{16E628D1-1F86-AA9A-9242-5F830C588D5C}"/>
               </a:ext>
             </a:extLst>
           </p:cNvPr>
@@ -11313,8 +11367,8 @@
         </p:blipFill>
         <p:spPr>
           <a:xfrm>
-            <a:off x="4670853" y="1268017"/>
-            <a:ext cx="4004233" cy="3131747"/>
+            <a:off x="4638266" y="1310565"/>
+            <a:ext cx="4413043" cy="3284198"/>
           </a:xfrm>
           <a:prstGeom prst="rect">
             <a:avLst/>
@@ -11323,10 +11377,10 @@
       </p:pic>
       <p:sp>
         <p:nvSpPr>
-          <p:cNvPr id="8" name="TextBox 7">
+          <p:cNvPr id="12" name="TextBox 11">
             <a:extLst>
               <a:ext uri="{FF2B5EF4-FFF2-40B4-BE49-F238E27FC236}">
-                <a16:creationId xmlns:a16="http://schemas.microsoft.com/office/drawing/2014/main" id="{8CF20489-630C-3497-0FC1-41999A252F80}"/>
+                <a16:creationId xmlns:a16="http://schemas.microsoft.com/office/drawing/2014/main" id="{50B78556-4B23-063A-9A5A-8C02CF51089B}"/>
               </a:ext>
             </a:extLst>
           </p:cNvPr>
@@ -11335,8 +11389,8 @@
         </p:nvSpPr>
         <p:spPr>
           <a:xfrm>
-            <a:off x="7358449" y="507613"/>
-            <a:ext cx="1405451" cy="900246"/>
+            <a:off x="5383033" y="4689508"/>
+            <a:ext cx="3668276" cy="246221"/>
           </a:xfrm>
           <a:prstGeom prst="rect">
             <a:avLst/>
@@ -11350,43 +11404,12 @@
           <a:lstStyle/>
           <a:p>
             <a:r>
-              <a:rPr lang="en-US" sz="1050" dirty="0"/>
-              <a:t>From the bare eye, the months look evenly distributed when it comes to crime in general</a:t>
-            </a:r>
-          </a:p>
-        </p:txBody>
-      </p:sp>
-      <p:sp>
-        <p:nvSpPr>
-          <p:cNvPr id="9" name="TextBox 8">
-            <a:extLst>
-              <a:ext uri="{FF2B5EF4-FFF2-40B4-BE49-F238E27FC236}">
-                <a16:creationId xmlns:a16="http://schemas.microsoft.com/office/drawing/2014/main" id="{B5941702-5227-AA61-EBB5-0A481DBB78A4}"/>
-              </a:ext>
-            </a:extLst>
-          </p:cNvPr>
-          <p:cNvSpPr txBox="1"/>
-          <p:nvPr/>
-        </p:nvSpPr>
-        <p:spPr>
-          <a:xfrm>
-            <a:off x="3512409" y="593124"/>
-            <a:ext cx="1306727" cy="738664"/>
-          </a:xfrm>
-          <a:prstGeom prst="rect">
-            <a:avLst/>
-          </a:prstGeom>
-          <a:noFill/>
-        </p:spPr>
-        <p:txBody>
-          <a:bodyPr wrap="square" rtlCol="0">
-            <a:spAutoFit/>
-          </a:bodyPr>
-          <a:lstStyle/>
-          <a:p>
-            <a:r>
-              <a:rPr lang="en-US" sz="1050" dirty="0"/>
-              <a:t>Sole curiosity… crime analysis over the years in Austin, TX</a:t>
+              <a:rPr lang="en-US" sz="1000" dirty="0">
+                <a:solidFill>
+                  <a:schemeClr val="bg1"/>
+                </a:solidFill>
+              </a:rPr>
+              <a:t>Does there seem to be a trend in crime by month?</a:t>
             </a:r>
           </a:p>
         </p:txBody>
@@ -11446,7 +11469,7 @@
           <a:p>
             <a:r>
               <a:rPr lang="en-US" dirty="0"/>
-              <a:t>First Step</a:t>
+              <a:t>Basic Analysis cont.</a:t>
             </a:r>
           </a:p>
         </p:txBody>
@@ -11469,8 +11492,8 @@
         </p:nvSpPr>
         <p:spPr>
           <a:xfrm>
-            <a:off x="628650" y="1369219"/>
-            <a:ext cx="3254461" cy="3263504"/>
+            <a:off x="311700" y="1369219"/>
+            <a:ext cx="3334025" cy="3263504"/>
           </a:xfrm>
         </p:spPr>
         <p:txBody>
@@ -11479,38 +11502,52 @@
           </a:bodyPr>
           <a:lstStyle/>
           <a:p>
+            <a:pPr marL="146050" indent="0">
+              <a:buNone/>
+            </a:pPr>
             <a:r>
-              <a:rPr lang="en-US" dirty="0"/>
-              <a:t>After reading the csv, I wanted to see which types of theft crimes were reported the most</a:t>
+              <a:rPr lang="en-US" sz="1400" dirty="0"/>
+              <a:t>Which types of theft crimes were reported the most?</a:t>
             </a:r>
           </a:p>
           <a:p>
+            <a:pPr marL="146050" indent="0">
+              <a:buNone/>
+            </a:pPr>
+            <a:endParaRPr lang="en-US" sz="1400" dirty="0"/>
+          </a:p>
+          <a:p>
+            <a:pPr marL="146050" indent="0">
+              <a:buNone/>
+            </a:pPr>
+            <a:endParaRPr lang="en-US" sz="1400" dirty="0"/>
+          </a:p>
+          <a:p>
             <a:r>
-              <a:rPr lang="en-US" dirty="0"/>
-              <a:t>We know were going to be doing chi square so we do a critical value test</a:t>
+              <a:rPr lang="en-US" sz="1400" dirty="0"/>
+              <a:t>We are going to perform Chi Square Tests, so we need to find the Critical Value</a:t>
             </a:r>
           </a:p>
           <a:p>
+            <a:pPr marL="146050" indent="0">
+              <a:buNone/>
+            </a:pPr>
+            <a:endParaRPr lang="en-US" sz="1400" dirty="0"/>
+          </a:p>
+          <a:p>
             <a:r>
-              <a:rPr lang="en-US" b="0" i="0" dirty="0">
-                <a:solidFill>
-                  <a:srgbClr val="CCCCCC"/>
-                </a:solidFill>
-                <a:effectLst/>
-                <a:latin typeface="Menlo" panose="020B0609030804020204" pitchFamily="49" charset="0"/>
-              </a:rPr>
-              <a:t>7.814727903251179</a:t>
+              <a:rPr lang="en-US" sz="1400" dirty="0"/>
+              <a:t>Critical Value = 7.8147279032511</a:t>
             </a:r>
-            <a:endParaRPr lang="en-US" dirty="0"/>
           </a:p>
         </p:txBody>
       </p:sp>
       <p:pic>
         <p:nvPicPr>
-          <p:cNvPr id="4" name="Picture 3">
+          <p:cNvPr id="5" name="Picture 4">
             <a:extLst>
               <a:ext uri="{FF2B5EF4-FFF2-40B4-BE49-F238E27FC236}">
-                <a16:creationId xmlns:a16="http://schemas.microsoft.com/office/drawing/2014/main" id="{C14810CF-B5D8-C853-C2BB-833278D7E1D6}"/>
+                <a16:creationId xmlns:a16="http://schemas.microsoft.com/office/drawing/2014/main" id="{931B5204-D448-8027-98A6-4B2D744A7858}"/>
               </a:ext>
             </a:extLst>
           </p:cNvPr>
@@ -11527,8 +11564,8 @@
         </p:blipFill>
         <p:spPr>
           <a:xfrm>
-            <a:off x="4213112" y="599323"/>
-            <a:ext cx="4396458" cy="4270334"/>
+            <a:off x="3883111" y="237505"/>
+            <a:ext cx="5157522" cy="4702629"/>
           </a:xfrm>
           <a:prstGeom prst="rect">
             <a:avLst/>
@@ -11618,81 +11655,127 @@
           </a:xfrm>
         </p:spPr>
         <p:txBody>
-          <a:bodyPr/>
+          <a:bodyPr>
+            <a:noAutofit/>
+          </a:bodyPr>
           <a:lstStyle/>
           <a:p>
             <a:r>
-              <a:rPr lang="en-US" dirty="0"/>
+              <a:rPr lang="en-US" sz="1400" dirty="0">
+                <a:solidFill>
+                  <a:schemeClr val="bg1"/>
+                </a:solidFill>
+              </a:rPr>
               <a:t>Looks to be less in the Winter</a:t>
             </a:r>
           </a:p>
           <a:p>
-            <a:endParaRPr lang="en-US" sz="1200" dirty="0"/>
+            <a:endParaRPr lang="en-US" sz="1400" dirty="0">
+              <a:solidFill>
+                <a:schemeClr val="bg1"/>
+              </a:solidFill>
+            </a:endParaRPr>
           </a:p>
           <a:p>
             <a:r>
-              <a:rPr lang="en-US" sz="1200" dirty="0">
+              <a:rPr lang="en-US" sz="1400" dirty="0">
                 <a:solidFill>
-                  <a:schemeClr val="accent5"/>
+                  <a:schemeClr val="bg1"/>
                 </a:solidFill>
-                <a:latin typeface="Menlo" panose="020B0609030804020204" pitchFamily="49" charset="0"/>
+                <a:latin typeface="Lato" panose="020F0502020204030203" pitchFamily="34" charset="0"/>
+                <a:ea typeface="Lato" panose="020F0502020204030203" pitchFamily="34" charset="0"/>
+                <a:cs typeface="Lato" panose="020F0502020204030203" pitchFamily="34" charset="0"/>
               </a:rPr>
               <a:t>Chi-Square Statistic: 68.10559048133163 </a:t>
             </a:r>
           </a:p>
           <a:p>
             <a:r>
-              <a:rPr lang="en-US" sz="1200" dirty="0">
+              <a:rPr lang="en-US" sz="1400" dirty="0">
                 <a:solidFill>
-                  <a:schemeClr val="accent5"/>
+                  <a:schemeClr val="bg1"/>
                 </a:solidFill>
-                <a:latin typeface="Menlo" panose="020B0609030804020204" pitchFamily="49" charset="0"/>
+                <a:latin typeface="Lato" panose="020F0502020204030203" pitchFamily="34" charset="0"/>
+                <a:ea typeface="Lato" panose="020F0502020204030203" pitchFamily="34" charset="0"/>
+                <a:cs typeface="Lato" panose="020F0502020204030203" pitchFamily="34" charset="0"/>
               </a:rPr>
-              <a:t>p-value: 1.0860061995797653e-14</a:t>
+              <a:t>P-value: 1.0860061995797653e-14</a:t>
             </a:r>
           </a:p>
           <a:p>
-            <a:endParaRPr lang="en-US" sz="1200" dirty="0">
+            <a:endParaRPr lang="en-US" sz="1400" dirty="0">
               <a:solidFill>
-                <a:schemeClr val="accent5"/>
+                <a:schemeClr val="bg1"/>
               </a:solidFill>
-              <a:latin typeface="Menlo" panose="020B0609030804020204" pitchFamily="49" charset="0"/>
+              <a:latin typeface="Lato" panose="020F0502020204030203" pitchFamily="34" charset="0"/>
+              <a:ea typeface="Lato" panose="020F0502020204030203" pitchFamily="34" charset="0"/>
+              <a:cs typeface="Lato" panose="020F0502020204030203" pitchFamily="34" charset="0"/>
             </a:endParaRPr>
           </a:p>
           <a:p>
             <a:r>
-              <a:rPr lang="en-US" sz="1200" dirty="0">
+              <a:rPr lang="en-US" sz="1400" dirty="0">
                 <a:solidFill>
-                  <a:schemeClr val="accent5"/>
+                  <a:schemeClr val="bg1"/>
                 </a:solidFill>
-                <a:latin typeface="Menlo" panose="020B0609030804020204" pitchFamily="49" charset="0"/>
+                <a:latin typeface="Lato" panose="020F0502020204030203" pitchFamily="34" charset="0"/>
+                <a:ea typeface="Lato" panose="020F0502020204030203" pitchFamily="34" charset="0"/>
+                <a:cs typeface="Lato" panose="020F0502020204030203" pitchFamily="34" charset="0"/>
               </a:rPr>
-              <a:t>With a very high chi-square value and a very low p-value this tells us that we can reject the null hypothesis and say </a:t>
+              <a:t>With a very high Chi-Square value and a very low P-value</a:t>
             </a:r>
-          </a:p>
-          <a:p>
-            <a:endParaRPr lang="en-US" sz="1200" dirty="0">
+            <a:r>
+              <a:rPr lang="en-US" sz="1400" dirty="0">
+                <a:solidFill>
+                  <a:schemeClr val="bg1"/>
+                </a:solidFill>
+                <a:latin typeface="Lato" panose="020F0502020204030203" pitchFamily="34" charset="0"/>
+                <a:ea typeface="Lato" panose="020F0502020204030203" pitchFamily="34" charset="0"/>
+                <a:cs typeface="Lato" panose="020F0502020204030203" pitchFamily="34" charset="0"/>
+                <a:sym typeface="Wingdings" pitchFamily="2" charset="2"/>
+              </a:rPr>
+              <a:t></a:t>
+            </a:r>
+            <a:r>
+              <a:rPr lang="en-US" sz="1400" dirty="0">
+                <a:solidFill>
+                  <a:schemeClr val="bg1"/>
+                </a:solidFill>
+                <a:latin typeface="Lato" panose="020F0502020204030203" pitchFamily="34" charset="0"/>
+                <a:ea typeface="Lato" panose="020F0502020204030203" pitchFamily="34" charset="0"/>
+                <a:cs typeface="Lato" panose="020F0502020204030203" pitchFamily="34" charset="0"/>
+              </a:rPr>
+              <a:t> this tells us that we can reject the null hypothesis and say..</a:t>
+            </a:r>
+          </a:p>
+          <a:p>
+            <a:pPr marL="146050" indent="0">
+              <a:buNone/>
+            </a:pPr>
+            <a:endParaRPr lang="en-US" sz="1400" dirty="0">
               <a:solidFill>
-                <a:schemeClr val="accent5"/>
+                <a:schemeClr val="bg1"/>
               </a:solidFill>
-              <a:latin typeface="Menlo" panose="020B0609030804020204" pitchFamily="49" charset="0"/>
+              <a:latin typeface="Lato" panose="020F0502020204030203" pitchFamily="34" charset="0"/>
+              <a:ea typeface="Lato" panose="020F0502020204030203" pitchFamily="34" charset="0"/>
+              <a:cs typeface="Lato" panose="020F0502020204030203" pitchFamily="34" charset="0"/>
             </a:endParaRPr>
           </a:p>
           <a:p>
+            <a:pPr marL="146050" indent="0">
+              <a:buNone/>
+            </a:pPr>
             <a:r>
-              <a:rPr lang="en-US" sz="1200" dirty="0">
+              <a:rPr lang="en-US" sz="1400" dirty="0">
                 <a:solidFill>
-                  <a:schemeClr val="accent5"/>
+                  <a:schemeClr val="bg1"/>
                 </a:solidFill>
-                <a:latin typeface="Menlo" panose="020B0609030804020204" pitchFamily="49" charset="0"/>
+                <a:latin typeface="Lato" panose="020F0502020204030203" pitchFamily="34" charset="0"/>
+                <a:ea typeface="Lato" panose="020F0502020204030203" pitchFamily="34" charset="0"/>
+                <a:cs typeface="Lato" panose="020F0502020204030203" pitchFamily="34" charset="0"/>
               </a:rPr>
               <a:t>SEASON COULD DEFINITELY BE AFFECTING THE NUMBER OF RESIDENTIAL BURGLARIES </a:t>
             </a:r>
-            <a:endParaRPr lang="en-US" sz="1200" dirty="0">
-              <a:solidFill>
-                <a:schemeClr val="accent5"/>
-              </a:solidFill>
-            </a:endParaRPr>
           </a:p>
         </p:txBody>
       </p:sp>
@@ -11718,8 +11801,8 @@
         </p:blipFill>
         <p:spPr>
           <a:xfrm>
-            <a:off x="4572000" y="1186803"/>
-            <a:ext cx="4038600" cy="3105150"/>
+            <a:off x="4429898" y="1369219"/>
+            <a:ext cx="4623912" cy="3263504"/>
           </a:xfrm>
           <a:prstGeom prst="rect">
             <a:avLst/>
@@ -11781,7 +11864,7 @@
           <a:p>
             <a:r>
               <a:rPr lang="en-US" dirty="0"/>
-              <a:t>Shoplifting</a:t>
+              <a:t>Shoplifting By Season</a:t>
             </a:r>
           </a:p>
         </p:txBody>
@@ -11809,13 +11892,124 @@
           </a:xfrm>
         </p:spPr>
         <p:txBody>
-          <a:bodyPr/>
+          <a:bodyPr>
+            <a:normAutofit lnSpcReduction="10000"/>
+          </a:bodyPr>
           <a:lstStyle/>
           <a:p>
             <a:r>
-              <a:rPr lang="en-US" dirty="0"/>
-              <a:t>Pretty even, but maybe less in the fall</a:t>
+              <a:rPr lang="en-US" sz="1400" dirty="0"/>
+              <a:t>Pretty even from the naked eye, but </a:t>
             </a:r>
+            <a:r>
+              <a:rPr lang="en-US" sz="1400" dirty="0">
+                <a:solidFill>
+                  <a:schemeClr val="bg1"/>
+                </a:solidFill>
+              </a:rPr>
+              <a:t>maybe less in the fall</a:t>
+            </a:r>
+          </a:p>
+          <a:p>
+            <a:endParaRPr lang="en-US" sz="1400" dirty="0">
+              <a:solidFill>
+                <a:schemeClr val="bg1"/>
+              </a:solidFill>
+            </a:endParaRPr>
+          </a:p>
+          <a:p>
+            <a:r>
+              <a:rPr lang="en-US" sz="1600" b="0" i="0" dirty="0">
+                <a:solidFill>
+                  <a:schemeClr val="bg1"/>
+                </a:solidFill>
+                <a:effectLst/>
+                <a:latin typeface="Lato" panose="020F0502020204030203" pitchFamily="34" charset="0"/>
+                <a:ea typeface="Lato" panose="020F0502020204030203" pitchFamily="34" charset="0"/>
+                <a:cs typeface="Lato" panose="020F0502020204030203" pitchFamily="34" charset="0"/>
+              </a:rPr>
+              <a:t>Chi-Square Statistic: 8.155594276196815 </a:t>
+            </a:r>
+          </a:p>
+          <a:p>
+            <a:r>
+              <a:rPr lang="en-US" sz="1600" dirty="0">
+                <a:solidFill>
+                  <a:schemeClr val="bg1"/>
+                </a:solidFill>
+                <a:latin typeface="Lato" panose="020F0502020204030203" pitchFamily="34" charset="0"/>
+                <a:ea typeface="Lato" panose="020F0502020204030203" pitchFamily="34" charset="0"/>
+                <a:cs typeface="Lato" panose="020F0502020204030203" pitchFamily="34" charset="0"/>
+              </a:rPr>
+              <a:t>P</a:t>
+            </a:r>
+            <a:r>
+              <a:rPr lang="en-US" sz="1600" b="0" i="0" dirty="0">
+                <a:solidFill>
+                  <a:schemeClr val="bg1"/>
+                </a:solidFill>
+                <a:effectLst/>
+                <a:latin typeface="Lato" panose="020F0502020204030203" pitchFamily="34" charset="0"/>
+                <a:ea typeface="Lato" panose="020F0502020204030203" pitchFamily="34" charset="0"/>
+                <a:cs typeface="Lato" panose="020F0502020204030203" pitchFamily="34" charset="0"/>
+              </a:rPr>
+              <a:t>-value: 0.04290314382794721</a:t>
+            </a:r>
+          </a:p>
+          <a:p>
+            <a:endParaRPr lang="en-US" sz="1600" dirty="0">
+              <a:solidFill>
+                <a:schemeClr val="bg1"/>
+              </a:solidFill>
+              <a:latin typeface="Lato" panose="020F0502020204030203" pitchFamily="34" charset="0"/>
+              <a:ea typeface="Lato" panose="020F0502020204030203" pitchFamily="34" charset="0"/>
+              <a:cs typeface="Lato" panose="020F0502020204030203" pitchFamily="34" charset="0"/>
+            </a:endParaRPr>
+          </a:p>
+          <a:p>
+            <a:r>
+              <a:rPr lang="en-US" sz="1600" dirty="0">
+                <a:solidFill>
+                  <a:schemeClr val="bg1"/>
+                </a:solidFill>
+                <a:latin typeface="Lato" panose="020F0502020204030203" pitchFamily="34" charset="0"/>
+                <a:ea typeface="Lato" panose="020F0502020204030203" pitchFamily="34" charset="0"/>
+                <a:cs typeface="Lato" panose="020F0502020204030203" pitchFamily="34" charset="0"/>
+              </a:rPr>
+              <a:t>While the Chi-Square is a lot closer to Critical Value compared to the other tests, P-value is still below 0.5. Still reject Null Hypothesis</a:t>
+            </a:r>
+          </a:p>
+          <a:p>
+            <a:pPr marL="146050" indent="0">
+              <a:buNone/>
+            </a:pPr>
+            <a:endParaRPr lang="en-US" sz="1400" dirty="0">
+              <a:solidFill>
+                <a:schemeClr val="bg1"/>
+              </a:solidFill>
+            </a:endParaRPr>
+          </a:p>
+          <a:p>
+            <a:endParaRPr lang="en-US" sz="1400" dirty="0">
+              <a:solidFill>
+                <a:schemeClr val="bg1"/>
+              </a:solidFill>
+              <a:latin typeface="Lato" panose="020F0502020204030203" pitchFamily="34" charset="0"/>
+              <a:ea typeface="Lato" panose="020F0502020204030203" pitchFamily="34" charset="0"/>
+              <a:cs typeface="Lato" panose="020F0502020204030203" pitchFamily="34" charset="0"/>
+            </a:endParaRPr>
+          </a:p>
+          <a:p>
+            <a:pPr marL="146050" indent="0">
+              <a:buNone/>
+            </a:pPr>
+            <a:endParaRPr lang="en-US" sz="1400" dirty="0"/>
+          </a:p>
+          <a:p>
+            <a:endParaRPr lang="en-US" sz="1400" dirty="0"/>
+          </a:p>
+          <a:p>
+            <a:endParaRPr lang="en-US" sz="1400" dirty="0"/>
           </a:p>
           <a:p>
             <a:endParaRPr lang="en-US" dirty="0"/>
@@ -11847,8 +12041,8 @@
         </p:blipFill>
         <p:spPr>
           <a:xfrm>
-            <a:off x="4572000" y="1019175"/>
-            <a:ext cx="4038600" cy="3105150"/>
+            <a:off x="4383560" y="1174901"/>
+            <a:ext cx="4497290" cy="3457822"/>
           </a:xfrm>
           <a:prstGeom prst="rect">
             <a:avLst/>
@@ -11934,23 +12128,155 @@
         <p:spPr>
           <a:xfrm>
             <a:off x="628651" y="1369219"/>
-            <a:ext cx="3866120" cy="3263504"/>
+            <a:ext cx="3337707" cy="3263504"/>
           </a:xfrm>
         </p:spPr>
         <p:txBody>
-          <a:bodyPr/>
+          <a:bodyPr>
+            <a:normAutofit fontScale="92500" lnSpcReduction="20000"/>
+          </a:bodyPr>
           <a:lstStyle/>
           <a:p>
             <a:r>
-              <a:rPr lang="en-US" dirty="0"/>
-              <a:t>ALL TIME LOW IN THE WINTER</a:t>
+              <a:rPr lang="en-US" sz="1400" dirty="0"/>
+              <a:t>LOW IN THE WINTER</a:t>
             </a:r>
           </a:p>
           <a:p>
             <a:r>
-              <a:rPr lang="en-US" dirty="0"/>
-              <a:t>ALL TIME HIGH IN THE SUMMER</a:t>
+              <a:rPr lang="en-US" sz="1400" dirty="0"/>
+              <a:t>HIGH IN THE SUMMER</a:t>
             </a:r>
+          </a:p>
+          <a:p>
+            <a:pPr marL="146050" indent="0">
+              <a:buNone/>
+            </a:pPr>
+            <a:endParaRPr lang="en-US" sz="1400" dirty="0">
+              <a:solidFill>
+                <a:schemeClr val="bg1"/>
+              </a:solidFill>
+            </a:endParaRPr>
+          </a:p>
+          <a:p>
+            <a:r>
+              <a:rPr lang="en-US" sz="1400" b="0" i="0" dirty="0">
+                <a:solidFill>
+                  <a:schemeClr val="bg1"/>
+                </a:solidFill>
+                <a:effectLst/>
+                <a:latin typeface="Lato" panose="020F0502020204030203" pitchFamily="34" charset="0"/>
+                <a:ea typeface="Lato" panose="020F0502020204030203" pitchFamily="34" charset="0"/>
+                <a:cs typeface="Lato" panose="020F0502020204030203" pitchFamily="34" charset="0"/>
+              </a:rPr>
+              <a:t>Chi-Square Statistic: 133.9015818401975 </a:t>
+            </a:r>
+          </a:p>
+          <a:p>
+            <a:r>
+              <a:rPr lang="en-US" sz="1400" dirty="0">
+                <a:solidFill>
+                  <a:schemeClr val="bg1"/>
+                </a:solidFill>
+                <a:latin typeface="Lato" panose="020F0502020204030203" pitchFamily="34" charset="0"/>
+                <a:ea typeface="Lato" panose="020F0502020204030203" pitchFamily="34" charset="0"/>
+                <a:cs typeface="Lato" panose="020F0502020204030203" pitchFamily="34" charset="0"/>
+              </a:rPr>
+              <a:t>P</a:t>
+            </a:r>
+            <a:r>
+              <a:rPr lang="en-US" sz="1400" b="0" i="0" dirty="0">
+                <a:solidFill>
+                  <a:schemeClr val="bg1"/>
+                </a:solidFill>
+                <a:effectLst/>
+                <a:latin typeface="Lato" panose="020F0502020204030203" pitchFamily="34" charset="0"/>
+                <a:ea typeface="Lato" panose="020F0502020204030203" pitchFamily="34" charset="0"/>
+                <a:cs typeface="Lato" panose="020F0502020204030203" pitchFamily="34" charset="0"/>
+              </a:rPr>
+              <a:t>-value: 7.801563909349704e-29</a:t>
+            </a:r>
+          </a:p>
+          <a:p>
+            <a:pPr marL="146050" indent="0">
+              <a:buNone/>
+            </a:pPr>
+            <a:endParaRPr lang="en-US" sz="1400" dirty="0">
+              <a:solidFill>
+                <a:schemeClr val="bg1"/>
+              </a:solidFill>
+              <a:latin typeface="Lato" panose="020F0502020204030203" pitchFamily="34" charset="0"/>
+              <a:ea typeface="Lato" panose="020F0502020204030203" pitchFamily="34" charset="0"/>
+              <a:cs typeface="Lato" panose="020F0502020204030203" pitchFamily="34" charset="0"/>
+            </a:endParaRPr>
+          </a:p>
+          <a:p>
+            <a:r>
+              <a:rPr lang="en-US" sz="1400" dirty="0">
+                <a:solidFill>
+                  <a:schemeClr val="bg1"/>
+                </a:solidFill>
+                <a:latin typeface="Lato" panose="020F0502020204030203" pitchFamily="34" charset="0"/>
+                <a:ea typeface="Lato" panose="020F0502020204030203" pitchFamily="34" charset="0"/>
+                <a:cs typeface="Lato" panose="020F0502020204030203" pitchFamily="34" charset="0"/>
+              </a:rPr>
+              <a:t>With a very high Chi-Square value and a very low P-value</a:t>
+            </a:r>
+            <a:r>
+              <a:rPr lang="en-US" sz="1400" dirty="0">
+                <a:solidFill>
+                  <a:schemeClr val="bg1"/>
+                </a:solidFill>
+                <a:latin typeface="Lato" panose="020F0502020204030203" pitchFamily="34" charset="0"/>
+                <a:ea typeface="Lato" panose="020F0502020204030203" pitchFamily="34" charset="0"/>
+                <a:cs typeface="Lato" panose="020F0502020204030203" pitchFamily="34" charset="0"/>
+                <a:sym typeface="Wingdings" pitchFamily="2" charset="2"/>
+              </a:rPr>
+              <a:t></a:t>
+            </a:r>
+            <a:r>
+              <a:rPr lang="en-US" sz="1400" dirty="0">
+                <a:solidFill>
+                  <a:schemeClr val="bg1"/>
+                </a:solidFill>
+                <a:latin typeface="Lato" panose="020F0502020204030203" pitchFamily="34" charset="0"/>
+                <a:ea typeface="Lato" panose="020F0502020204030203" pitchFamily="34" charset="0"/>
+                <a:cs typeface="Lato" panose="020F0502020204030203" pitchFamily="34" charset="0"/>
+              </a:rPr>
+              <a:t> this tells us that we can reject the null hypothesis and say..</a:t>
+            </a:r>
+          </a:p>
+          <a:p>
+            <a:pPr marL="146050" indent="0">
+              <a:buNone/>
+            </a:pPr>
+            <a:endParaRPr lang="en-US" sz="1400" dirty="0">
+              <a:solidFill>
+                <a:schemeClr val="bg1"/>
+              </a:solidFill>
+              <a:latin typeface="Lato" panose="020F0502020204030203" pitchFamily="34" charset="0"/>
+              <a:ea typeface="Lato" panose="020F0502020204030203" pitchFamily="34" charset="0"/>
+              <a:cs typeface="Lato" panose="020F0502020204030203" pitchFamily="34" charset="0"/>
+            </a:endParaRPr>
+          </a:p>
+          <a:p>
+            <a:pPr marL="146050" indent="0">
+              <a:buNone/>
+            </a:pPr>
+            <a:r>
+              <a:rPr lang="en-US" sz="1400" dirty="0">
+                <a:solidFill>
+                  <a:schemeClr val="bg1"/>
+                </a:solidFill>
+                <a:latin typeface="Lato" panose="020F0502020204030203" pitchFamily="34" charset="0"/>
+                <a:ea typeface="Lato" panose="020F0502020204030203" pitchFamily="34" charset="0"/>
+                <a:cs typeface="Lato" panose="020F0502020204030203" pitchFamily="34" charset="0"/>
+              </a:rPr>
+              <a:t>SEASON COULD DEFINITELY BE AFFECTING THE NUMBER OF RESIDENTIAL BICYCLE THEFTS</a:t>
+            </a:r>
+          </a:p>
+          <a:p>
+            <a:endParaRPr lang="en-US" dirty="0"/>
           </a:p>
         </p:txBody>
       </p:sp>
@@ -11976,8 +12302,8 @@
         </p:blipFill>
         <p:spPr>
           <a:xfrm>
-            <a:off x="4649231" y="770930"/>
-            <a:ext cx="3971925" cy="3105150"/>
+            <a:off x="4061362" y="824806"/>
+            <a:ext cx="4771381" cy="3723443"/>
           </a:xfrm>
           <a:prstGeom prst="rect">
             <a:avLst/>
@@ -12062,8 +12388,8 @@
         </p:nvSpPr>
         <p:spPr>
           <a:xfrm>
-            <a:off x="628651" y="1369219"/>
-            <a:ext cx="3133982" cy="3263504"/>
+            <a:off x="628650" y="1369219"/>
+            <a:ext cx="3313957" cy="3263504"/>
           </a:xfrm>
         </p:spPr>
         <p:txBody>
@@ -12073,64 +12399,123 @@
           <a:lstStyle/>
           <a:p>
             <a:r>
-              <a:rPr lang="en-US" b="0" i="0" dirty="0">
+              <a:rPr lang="en-US" sz="1400" b="0" i="0" dirty="0">
                 <a:solidFill>
-                  <a:srgbClr val="CCCCCC"/>
+                  <a:schemeClr val="bg1"/>
                 </a:solidFill>
                 <a:effectLst/>
-                <a:latin typeface="Menlo" panose="020B0609030804020204" pitchFamily="49" charset="0"/>
+                <a:latin typeface="Lato" panose="020F0502020204030203" pitchFamily="34" charset="0"/>
+                <a:ea typeface="Lato" panose="020F0502020204030203" pitchFamily="34" charset="0"/>
+                <a:cs typeface="Lato" panose="020F0502020204030203" pitchFamily="34" charset="0"/>
               </a:rPr>
-              <a:t>Chi-Square Statistic: 280.6044358946858 p-value: 1.566923504984882e-60</a:t>
+              <a:t>Chi-Square Statistic: 280.6044358946858 </a:t>
             </a:r>
           </a:p>
           <a:p>
-            <a:endParaRPr lang="en-US" dirty="0">
+            <a:r>
+              <a:rPr lang="en-US" sz="1400" dirty="0">
+                <a:solidFill>
+                  <a:schemeClr val="bg1"/>
+                </a:solidFill>
+                <a:latin typeface="Lato" panose="020F0502020204030203" pitchFamily="34" charset="0"/>
+                <a:ea typeface="Lato" panose="020F0502020204030203" pitchFamily="34" charset="0"/>
+                <a:cs typeface="Lato" panose="020F0502020204030203" pitchFamily="34" charset="0"/>
+              </a:rPr>
+              <a:t>P</a:t>
+            </a:r>
+            <a:r>
+              <a:rPr lang="en-US" sz="1400" b="0" i="0" dirty="0">
+                <a:solidFill>
+                  <a:schemeClr val="bg1"/>
+                </a:solidFill>
+                <a:effectLst/>
+                <a:latin typeface="Lato" panose="020F0502020204030203" pitchFamily="34" charset="0"/>
+                <a:ea typeface="Lato" panose="020F0502020204030203" pitchFamily="34" charset="0"/>
+                <a:cs typeface="Lato" panose="020F0502020204030203" pitchFamily="34" charset="0"/>
+              </a:rPr>
+              <a:t>-value: </a:t>
+            </a:r>
+          </a:p>
+          <a:p>
+            <a:r>
+              <a:rPr lang="en-US" sz="1400" b="0" i="0">
+                <a:solidFill>
+                  <a:schemeClr val="bg1"/>
+                </a:solidFill>
+                <a:effectLst/>
+                <a:latin typeface="Lato" panose="020F0502020204030203" pitchFamily="34" charset="0"/>
+                <a:ea typeface="Lato" panose="020F0502020204030203" pitchFamily="34" charset="0"/>
+                <a:cs typeface="Lato" panose="020F0502020204030203" pitchFamily="34" charset="0"/>
+              </a:rPr>
+              <a:t>1.566923504984882e-60</a:t>
+            </a:r>
+            <a:endParaRPr lang="en-US" sz="1400" b="0" i="0" dirty="0">
               <a:solidFill>
-                <a:srgbClr val="CCCCCC"/>
+                <a:schemeClr val="bg1"/>
               </a:solidFill>
-              <a:latin typeface="Menlo" panose="020B0609030804020204" pitchFamily="49" charset="0"/>
+              <a:effectLst/>
+              <a:latin typeface="Lato" panose="020F0502020204030203" pitchFamily="34" charset="0"/>
+              <a:ea typeface="Lato" panose="020F0502020204030203" pitchFamily="34" charset="0"/>
+              <a:cs typeface="Lato" panose="020F0502020204030203" pitchFamily="34" charset="0"/>
             </a:endParaRPr>
           </a:p>
           <a:p>
+            <a:endParaRPr lang="en-US" sz="1400" dirty="0">
+              <a:solidFill>
+                <a:schemeClr val="bg1"/>
+              </a:solidFill>
+              <a:latin typeface="Lato" panose="020F0502020204030203" pitchFamily="34" charset="0"/>
+              <a:ea typeface="Lato" panose="020F0502020204030203" pitchFamily="34" charset="0"/>
+              <a:cs typeface="Lato" panose="020F0502020204030203" pitchFamily="34" charset="0"/>
+            </a:endParaRPr>
+          </a:p>
+          <a:p>
             <a:r>
-              <a:rPr lang="en-US" dirty="0">
+              <a:rPr lang="en-US" sz="1400" dirty="0">
                 <a:solidFill>
-                  <a:srgbClr val="CCCCCC"/>
+                  <a:schemeClr val="bg1"/>
                 </a:solidFill>
-                <a:latin typeface="Menlo" panose="020B0609030804020204" pitchFamily="49" charset="0"/>
+                <a:latin typeface="Lato" panose="020F0502020204030203" pitchFamily="34" charset="0"/>
+                <a:ea typeface="Lato" panose="020F0502020204030203" pitchFamily="34" charset="0"/>
+                <a:cs typeface="Lato" panose="020F0502020204030203" pitchFamily="34" charset="0"/>
               </a:rPr>
               <a:t>REJECT NULL HYPOTHESIS </a:t>
             </a:r>
           </a:p>
           <a:p>
             <a:r>
-              <a:rPr lang="en-US" dirty="0">
+              <a:rPr lang="en-US" sz="1400" dirty="0">
                 <a:solidFill>
-                  <a:srgbClr val="CCCCCC"/>
+                  <a:schemeClr val="bg1"/>
                 </a:solidFill>
-                <a:latin typeface="Menlo" panose="020B0609030804020204" pitchFamily="49" charset="0"/>
+                <a:latin typeface="Lato" panose="020F0502020204030203" pitchFamily="34" charset="0"/>
+                <a:ea typeface="Lato" panose="020F0502020204030203" pitchFamily="34" charset="0"/>
+                <a:cs typeface="Lato" panose="020F0502020204030203" pitchFamily="34" charset="0"/>
               </a:rPr>
               <a:t>This means.. Season could </a:t>
             </a:r>
             <a:r>
-              <a:rPr lang="en-US" u="sng" dirty="0">
+              <a:rPr lang="en-US" sz="1400" u="sng" dirty="0">
                 <a:solidFill>
-                  <a:srgbClr val="CCCCCC"/>
+                  <a:schemeClr val="bg1"/>
                 </a:solidFill>
-                <a:latin typeface="Menlo" panose="020B0609030804020204" pitchFamily="49" charset="0"/>
+                <a:latin typeface="Lato" panose="020F0502020204030203" pitchFamily="34" charset="0"/>
+                <a:ea typeface="Lato" panose="020F0502020204030203" pitchFamily="34" charset="0"/>
+                <a:cs typeface="Lato" panose="020F0502020204030203" pitchFamily="34" charset="0"/>
               </a:rPr>
               <a:t>be</a:t>
             </a:r>
             <a:r>
-              <a:rPr lang="en-US" dirty="0">
+              <a:rPr lang="en-US" sz="1400" dirty="0">
                 <a:solidFill>
-                  <a:srgbClr val="CCCCCC"/>
+                  <a:schemeClr val="bg1"/>
                 </a:solidFill>
-                <a:latin typeface="Menlo" panose="020B0609030804020204" pitchFamily="49" charset="0"/>
+                <a:latin typeface="Lato" panose="020F0502020204030203" pitchFamily="34" charset="0"/>
+                <a:ea typeface="Lato" panose="020F0502020204030203" pitchFamily="34" charset="0"/>
+                <a:cs typeface="Lato" panose="020F0502020204030203" pitchFamily="34" charset="0"/>
               </a:rPr>
-              <a:t> having an impact on crime rate!!</a:t>
+              <a:t> having an impact on crime rate as a whole!!</a:t>
             </a:r>
-            <a:endParaRPr lang="en-US" dirty="0"/>
           </a:p>
         </p:txBody>
       </p:sp>
@@ -12156,8 +12541,8 @@
         </p:blipFill>
         <p:spPr>
           <a:xfrm>
-            <a:off x="3913773" y="1268016"/>
-            <a:ext cx="4095750" cy="3105150"/>
+            <a:off x="4136463" y="1138375"/>
+            <a:ext cx="4695837" cy="3560100"/>
           </a:xfrm>
           <a:prstGeom prst="rect">
             <a:avLst/>

</xml_diff>

<commit_message>
We are all set
</commit_message>
<xml_diff>
--- a/Project 1 Presentation Final.pptx
+++ b/Project 1 Presentation Final.pptx
@@ -25,7 +25,7 @@
     <p:sldId id="287" r:id="rId16"/>
     <p:sldId id="291" r:id="rId17"/>
     <p:sldId id="259" r:id="rId18"/>
-    <p:sldId id="260" r:id="rId19"/>
+    <p:sldId id="296" r:id="rId19"/>
     <p:sldId id="270" r:id="rId20"/>
   </p:sldIdLst>
   <p:sldSz cx="9144000" cy="5143500" type="screen16x9"/>
@@ -851,6 +851,115 @@
   <p:cSld>
     <p:spTree>
       <p:nvGrpSpPr>
+        <p:cNvPr id="1" name="Shape 57"/>
+        <p:cNvGrpSpPr/>
+        <p:nvPr/>
+      </p:nvGrpSpPr>
+      <p:grpSpPr>
+        <a:xfrm>
+          <a:off x="0" y="0"/>
+          <a:ext cx="0" cy="0"/>
+          <a:chOff x="0" y="0"/>
+          <a:chExt cx="0" cy="0"/>
+        </a:xfrm>
+      </p:grpSpPr>
+      <p:sp>
+        <p:nvSpPr>
+          <p:cNvPr id="58" name="Google Shape;58;g2e8c62c51a3_0_2:notes"/>
+          <p:cNvSpPr>
+            <a:spLocks noGrp="1" noRot="1" noChangeAspect="1"/>
+          </p:cNvSpPr>
+          <p:nvPr>
+            <p:ph type="sldImg" idx="2"/>
+          </p:nvPr>
+        </p:nvSpPr>
+        <p:spPr>
+          <a:xfrm>
+            <a:off x="381000" y="685800"/>
+            <a:ext cx="6096000" cy="3429000"/>
+          </a:xfrm>
+          <a:custGeom>
+            <a:avLst/>
+            <a:gdLst/>
+            <a:ahLst/>
+            <a:cxnLst/>
+            <a:rect l="l" t="t" r="r" b="b"/>
+            <a:pathLst>
+              <a:path w="120000" h="120000" extrusionOk="0">
+                <a:moveTo>
+                  <a:pt x="0" y="0"/>
+                </a:moveTo>
+                <a:lnTo>
+                  <a:pt x="120000" y="0"/>
+                </a:lnTo>
+                <a:lnTo>
+                  <a:pt x="120000" y="120000"/>
+                </a:lnTo>
+                <a:lnTo>
+                  <a:pt x="0" y="120000"/>
+                </a:lnTo>
+                <a:close/>
+              </a:path>
+            </a:pathLst>
+          </a:custGeom>
+        </p:spPr>
+      </p:sp>
+      <p:sp>
+        <p:nvSpPr>
+          <p:cNvPr id="59" name="Google Shape;59;g2e8c62c51a3_0_2:notes"/>
+          <p:cNvSpPr txBox="1">
+            <a:spLocks noGrp="1"/>
+          </p:cNvSpPr>
+          <p:nvPr>
+            <p:ph type="body" idx="1"/>
+          </p:nvPr>
+        </p:nvSpPr>
+        <p:spPr>
+          <a:xfrm>
+            <a:off x="685800" y="4343400"/>
+            <a:ext cx="5486400" cy="4114800"/>
+          </a:xfrm>
+          <a:prstGeom prst="rect">
+            <a:avLst/>
+          </a:prstGeom>
+        </p:spPr>
+        <p:txBody>
+          <a:bodyPr spcFirstLastPara="1" wrap="square" lIns="91425" tIns="91425" rIns="91425" bIns="91425" anchor="t" anchorCtr="0">
+            <a:noAutofit/>
+          </a:bodyPr>
+          <a:lstStyle/>
+          <a:p>
+            <a:pPr marL="0" lvl="0" indent="0" algn="l" rtl="0">
+              <a:spcBef>
+                <a:spcPts val="0"/>
+              </a:spcBef>
+              <a:spcAft>
+                <a:spcPts val="0"/>
+              </a:spcAft>
+              <a:buNone/>
+            </a:pPr>
+            <a:endParaRPr/>
+          </a:p>
+        </p:txBody>
+      </p:sp>
+    </p:spTree>
+    <p:extLst>
+      <p:ext uri="{BB962C8B-B14F-4D97-AF65-F5344CB8AC3E}">
+        <p14:creationId xmlns:p14="http://schemas.microsoft.com/office/powerpoint/2010/main" val="1693924299"/>
+      </p:ext>
+    </p:extLst>
+  </p:cSld>
+  <p:clrMapOvr>
+    <a:masterClrMapping/>
+  </p:clrMapOvr>
+</p:notes>
+</file>
+
+<file path=ppt/notesSlides/notesSlide11.xml><?xml version="1.0" encoding="utf-8"?>
+<p:notes xmlns:a="http://schemas.openxmlformats.org/drawingml/2006/main" xmlns:r="http://schemas.openxmlformats.org/officeDocument/2006/relationships" xmlns:p="http://schemas.openxmlformats.org/presentationml/2006/main" showMasterSp="0" showMasterPhAnim="0">
+  <p:cSld>
+    <p:spTree>
+      <p:nvGrpSpPr>
         <p:cNvPr id="1" name="Shape 141"/>
         <p:cNvGrpSpPr/>
         <p:nvPr/>
@@ -950,7 +1059,7 @@
 </p:notes>
 </file>
 
-<file path=ppt/notesSlides/notesSlide11.xml><?xml version="1.0" encoding="utf-8"?>
+<file path=ppt/notesSlides/notesSlide12.xml><?xml version="1.0" encoding="utf-8"?>
 <p:notes xmlns:a="http://schemas.openxmlformats.org/drawingml/2006/main" xmlns:r="http://schemas.openxmlformats.org/officeDocument/2006/relationships" xmlns:p="http://schemas.openxmlformats.org/presentationml/2006/main" showMasterSp="0" showMasterPhAnim="0">
   <p:cSld>
     <p:spTree>
@@ -1059,12 +1168,12 @@
 </p:notes>
 </file>
 
-<file path=ppt/notesSlides/notesSlide12.xml><?xml version="1.0" encoding="utf-8"?>
+<file path=ppt/notesSlides/notesSlide13.xml><?xml version="1.0" encoding="utf-8"?>
 <p:notes xmlns:a="http://schemas.openxmlformats.org/drawingml/2006/main" xmlns:r="http://schemas.openxmlformats.org/officeDocument/2006/relationships" xmlns:p="http://schemas.openxmlformats.org/presentationml/2006/main" showMasterSp="0" showMasterPhAnim="0">
   <p:cSld>
     <p:spTree>
       <p:nvGrpSpPr>
-        <p:cNvPr id="1" name="Shape 156"/>
+        <p:cNvPr id="1" name="Shape 148"/>
         <p:cNvGrpSpPr/>
         <p:nvPr/>
       </p:nvGrpSpPr>
@@ -1078,7 +1187,7 @@
       </p:grpSpPr>
       <p:sp>
         <p:nvSpPr>
-          <p:cNvPr id="157" name="Google Shape;157;g27017f578e1_2_0:notes"/>
+          <p:cNvPr id="149" name="Google Shape;149;g2d186381cfb_0_133:notes"/>
           <p:cNvSpPr>
             <a:spLocks noGrp="1" noRot="1" noChangeAspect="1"/>
           </p:cNvSpPr>
@@ -1119,7 +1228,7 @@
       </p:sp>
       <p:sp>
         <p:nvSpPr>
-          <p:cNvPr id="158" name="Google Shape;158;g27017f578e1_2_0:notes"/>
+          <p:cNvPr id="150" name="Google Shape;150;g2d186381cfb_0_133:notes"/>
           <p:cNvSpPr txBox="1">
             <a:spLocks noGrp="1"/>
           </p:cNvSpPr>
@@ -1151,14 +1260,14 @@
               </a:spcAft>
               <a:buNone/>
             </a:pPr>
-            <a:endParaRPr dirty="0"/>
+            <a:endParaRPr/>
           </a:p>
         </p:txBody>
       </p:sp>
     </p:spTree>
     <p:extLst>
       <p:ext uri="{BB962C8B-B14F-4D97-AF65-F5344CB8AC3E}">
-        <p14:creationId xmlns:p14="http://schemas.microsoft.com/office/powerpoint/2010/main" val="4195172281"/>
+        <p14:creationId xmlns:p14="http://schemas.microsoft.com/office/powerpoint/2010/main" val="610423410"/>
       </p:ext>
     </p:extLst>
   </p:cSld>
@@ -1168,7 +1277,7 @@
 </p:notes>
 </file>
 
-<file path=ppt/notesSlides/notesSlide13.xml><?xml version="1.0" encoding="utf-8"?>
+<file path=ppt/notesSlides/notesSlide14.xml><?xml version="1.0" encoding="utf-8"?>
 <p:notes xmlns:a="http://schemas.openxmlformats.org/drawingml/2006/main" xmlns:r="http://schemas.openxmlformats.org/officeDocument/2006/relationships" xmlns:p="http://schemas.openxmlformats.org/presentationml/2006/main" showMasterSp="0" showMasterPhAnim="0">
   <p:cSld>
     <p:spTree>
@@ -1382,6 +1491,144 @@
 </file>
 
 <file path=ppt/notesSlides/notesSlide3.xml><?xml version="1.0" encoding="utf-8"?>
+<p:notes xmlns:a="http://schemas.openxmlformats.org/drawingml/2006/main" xmlns:r="http://schemas.openxmlformats.org/officeDocument/2006/relationships" xmlns:p="http://schemas.openxmlformats.org/presentationml/2006/main">
+  <p:cSld>
+    <p:spTree>
+      <p:nvGrpSpPr>
+        <p:cNvPr id="1" name=""/>
+        <p:cNvGrpSpPr/>
+        <p:nvPr/>
+      </p:nvGrpSpPr>
+      <p:grpSpPr>
+        <a:xfrm>
+          <a:off x="0" y="0"/>
+          <a:ext cx="0" cy="0"/>
+          <a:chOff x="0" y="0"/>
+          <a:chExt cx="0" cy="0"/>
+        </a:xfrm>
+      </p:grpSpPr>
+      <p:sp>
+        <p:nvSpPr>
+          <p:cNvPr id="2" name="Slide Image Placeholder 1"/>
+          <p:cNvSpPr>
+            <a:spLocks noGrp="1" noRot="1" noChangeAspect="1"/>
+          </p:cNvSpPr>
+          <p:nvPr>
+            <p:ph type="sldImg"/>
+          </p:nvPr>
+        </p:nvSpPr>
+        <p:spPr>
+          <a:xfrm>
+            <a:off x="381000" y="685800"/>
+            <a:ext cx="6096000" cy="3429000"/>
+          </a:xfrm>
+        </p:spPr>
+      </p:sp>
+      <p:sp>
+        <p:nvSpPr>
+          <p:cNvPr id="3" name="Notes Placeholder 2"/>
+          <p:cNvSpPr>
+            <a:spLocks noGrp="1"/>
+          </p:cNvSpPr>
+          <p:nvPr>
+            <p:ph type="body" idx="1"/>
+          </p:nvPr>
+        </p:nvSpPr>
+        <p:spPr/>
+        <p:txBody>
+          <a:bodyPr/>
+          <a:lstStyle/>
+          <a:p>
+            <a:pPr marL="457200" marR="0" lvl="0" indent="-298450" algn="l" defTabSz="914400" rtl="0" eaLnBrk="1" fontAlgn="auto" latinLnBrk="0" hangingPunct="1">
+              <a:lnSpc>
+                <a:spcPct val="100000"/>
+              </a:lnSpc>
+              <a:spcBef>
+                <a:spcPts val="0"/>
+              </a:spcBef>
+              <a:spcAft>
+                <a:spcPts val="0"/>
+              </a:spcAft>
+              <a:buClr>
+                <a:srgbClr val="000000"/>
+              </a:buClr>
+              <a:buSzPts val="1100"/>
+              <a:buFont typeface="Arial"/>
+              <a:buChar char="●"/>
+              <a:tabLst/>
+              <a:defRPr/>
+            </a:pPr>
+            <a:r>
+              <a:rPr lang="en-US" sz="1100" dirty="0"/>
+              <a:t>Sole curiosity… crime analysis over the years in Austin, TX</a:t>
+            </a:r>
+          </a:p>
+          <a:p>
+            <a:pPr marL="457200" marR="0" lvl="0" indent="-298450" algn="l" defTabSz="914400" rtl="0" eaLnBrk="1" fontAlgn="auto" latinLnBrk="0" hangingPunct="1">
+              <a:lnSpc>
+                <a:spcPct val="100000"/>
+              </a:lnSpc>
+              <a:spcBef>
+                <a:spcPts val="0"/>
+              </a:spcBef>
+              <a:spcAft>
+                <a:spcPts val="0"/>
+              </a:spcAft>
+              <a:buClr>
+                <a:srgbClr val="000000"/>
+              </a:buClr>
+              <a:buSzPts val="1100"/>
+              <a:buFont typeface="Arial"/>
+              <a:buChar char="●"/>
+              <a:tabLst/>
+              <a:defRPr/>
+            </a:pPr>
+            <a:r>
+              <a:rPr lang="en-US" sz="1100" dirty="0"/>
+              <a:t>From the bare eye, the months look evenly distributed when it comes to crime in general</a:t>
+            </a:r>
+          </a:p>
+          <a:p>
+            <a:pPr marL="457200" marR="0" lvl="0" indent="-298450" algn="l" defTabSz="914400" rtl="0" eaLnBrk="1" fontAlgn="auto" latinLnBrk="0" hangingPunct="1">
+              <a:lnSpc>
+                <a:spcPct val="100000"/>
+              </a:lnSpc>
+              <a:spcBef>
+                <a:spcPts val="0"/>
+              </a:spcBef>
+              <a:spcAft>
+                <a:spcPts val="0"/>
+              </a:spcAft>
+              <a:buClr>
+                <a:srgbClr val="000000"/>
+              </a:buClr>
+              <a:buSzPts val="1100"/>
+              <a:buFont typeface="Arial"/>
+              <a:buChar char="●"/>
+              <a:tabLst/>
+              <a:defRPr/>
+            </a:pPr>
+            <a:endParaRPr lang="en-US" sz="1100" dirty="0"/>
+          </a:p>
+          <a:p>
+            <a:endParaRPr lang="en-US" dirty="0"/>
+          </a:p>
+        </p:txBody>
+      </p:sp>
+    </p:spTree>
+    <p:extLst>
+      <p:ext uri="{BB962C8B-B14F-4D97-AF65-F5344CB8AC3E}">
+        <p14:creationId xmlns:p14="http://schemas.microsoft.com/office/powerpoint/2010/main" val="4181609410"/>
+      </p:ext>
+    </p:extLst>
+  </p:cSld>
+  <p:clrMapOvr>
+    <a:masterClrMapping/>
+  </p:clrMapOvr>
+</p:notes>
+</file>
+
+<file path=ppt/notesSlides/notesSlide4.xml><?xml version="1.0" encoding="utf-8"?>
 <p:notes xmlns:a="http://schemas.openxmlformats.org/drawingml/2006/main" xmlns:r="http://schemas.openxmlformats.org/officeDocument/2006/relationships" xmlns:p="http://schemas.openxmlformats.org/presentationml/2006/main" showMasterSp="0" showMasterPhAnim="0">
   <p:cSld>
     <p:spTree>
@@ -1490,7 +1737,7 @@
 </p:notes>
 </file>
 
-<file path=ppt/notesSlides/notesSlide4.xml><?xml version="1.0" encoding="utf-8"?>
+<file path=ppt/notesSlides/notesSlide5.xml><?xml version="1.0" encoding="utf-8"?>
 <p:notes xmlns:a="http://schemas.openxmlformats.org/drawingml/2006/main" xmlns:r="http://schemas.openxmlformats.org/officeDocument/2006/relationships" xmlns:p="http://schemas.openxmlformats.org/presentationml/2006/main" showMasterSp="0" showMasterPhAnim="0">
   <p:cSld>
     <p:spTree>
@@ -1599,7 +1846,7 @@
 </p:notes>
 </file>
 
-<file path=ppt/notesSlides/notesSlide5.xml><?xml version="1.0" encoding="utf-8"?>
+<file path=ppt/notesSlides/notesSlide6.xml><?xml version="1.0" encoding="utf-8"?>
 <p:notes xmlns:a="http://schemas.openxmlformats.org/drawingml/2006/main" xmlns:r="http://schemas.openxmlformats.org/officeDocument/2006/relationships" xmlns:p="http://schemas.openxmlformats.org/presentationml/2006/main" showMasterSp="0" showMasterPhAnim="0">
   <p:cSld>
     <p:spTree>
@@ -1708,7 +1955,7 @@
 </p:notes>
 </file>
 
-<file path=ppt/notesSlides/notesSlide6.xml><?xml version="1.0" encoding="utf-8"?>
+<file path=ppt/notesSlides/notesSlide7.xml><?xml version="1.0" encoding="utf-8"?>
 <p:notes xmlns:a="http://schemas.openxmlformats.org/drawingml/2006/main" xmlns:r="http://schemas.openxmlformats.org/officeDocument/2006/relationships" xmlns:p="http://schemas.openxmlformats.org/presentationml/2006/main" showMasterSp="0" showMasterPhAnim="0">
   <p:cSld>
     <p:spTree>
@@ -1817,7 +2064,7 @@
 </p:notes>
 </file>
 
-<file path=ppt/notesSlides/notesSlide7.xml><?xml version="1.0" encoding="utf-8"?>
+<file path=ppt/notesSlides/notesSlide8.xml><?xml version="1.0" encoding="utf-8"?>
 <p:notes xmlns:a="http://schemas.openxmlformats.org/drawingml/2006/main" xmlns:r="http://schemas.openxmlformats.org/officeDocument/2006/relationships" xmlns:p="http://schemas.openxmlformats.org/presentationml/2006/main" showMasterSp="0" showMasterPhAnim="0">
   <p:cSld>
     <p:spTree>
@@ -1926,7 +2173,7 @@
 </p:notes>
 </file>
 
-<file path=ppt/notesSlides/notesSlide8.xml><?xml version="1.0" encoding="utf-8"?>
+<file path=ppt/notesSlides/notesSlide9.xml><?xml version="1.0" encoding="utf-8"?>
 <p:notes xmlns:a="http://schemas.openxmlformats.org/drawingml/2006/main" xmlns:r="http://schemas.openxmlformats.org/officeDocument/2006/relationships" xmlns:p="http://schemas.openxmlformats.org/presentationml/2006/main" showMasterSp="0" showMasterPhAnim="0">
   <p:cSld>
     <p:spTree>
@@ -2026,115 +2273,6 @@
     <p:extLst>
       <p:ext uri="{BB962C8B-B14F-4D97-AF65-F5344CB8AC3E}">
         <p14:creationId xmlns:p14="http://schemas.microsoft.com/office/powerpoint/2010/main" val="2802370134"/>
-      </p:ext>
-    </p:extLst>
-  </p:cSld>
-  <p:clrMapOvr>
-    <a:masterClrMapping/>
-  </p:clrMapOvr>
-</p:notes>
-</file>
-
-<file path=ppt/notesSlides/notesSlide9.xml><?xml version="1.0" encoding="utf-8"?>
-<p:notes xmlns:a="http://schemas.openxmlformats.org/drawingml/2006/main" xmlns:r="http://schemas.openxmlformats.org/officeDocument/2006/relationships" xmlns:p="http://schemas.openxmlformats.org/presentationml/2006/main" showMasterSp="0" showMasterPhAnim="0">
-  <p:cSld>
-    <p:spTree>
-      <p:nvGrpSpPr>
-        <p:cNvPr id="1" name="Shape 57"/>
-        <p:cNvGrpSpPr/>
-        <p:nvPr/>
-      </p:nvGrpSpPr>
-      <p:grpSpPr>
-        <a:xfrm>
-          <a:off x="0" y="0"/>
-          <a:ext cx="0" cy="0"/>
-          <a:chOff x="0" y="0"/>
-          <a:chExt cx="0" cy="0"/>
-        </a:xfrm>
-      </p:grpSpPr>
-      <p:sp>
-        <p:nvSpPr>
-          <p:cNvPr id="58" name="Google Shape;58;g2e8c62c51a3_0_2:notes"/>
-          <p:cNvSpPr>
-            <a:spLocks noGrp="1" noRot="1" noChangeAspect="1"/>
-          </p:cNvSpPr>
-          <p:nvPr>
-            <p:ph type="sldImg" idx="2"/>
-          </p:nvPr>
-        </p:nvSpPr>
-        <p:spPr>
-          <a:xfrm>
-            <a:off x="381000" y="685800"/>
-            <a:ext cx="6096000" cy="3429000"/>
-          </a:xfrm>
-          <a:custGeom>
-            <a:avLst/>
-            <a:gdLst/>
-            <a:ahLst/>
-            <a:cxnLst/>
-            <a:rect l="l" t="t" r="r" b="b"/>
-            <a:pathLst>
-              <a:path w="120000" h="120000" extrusionOk="0">
-                <a:moveTo>
-                  <a:pt x="0" y="0"/>
-                </a:moveTo>
-                <a:lnTo>
-                  <a:pt x="120000" y="0"/>
-                </a:lnTo>
-                <a:lnTo>
-                  <a:pt x="120000" y="120000"/>
-                </a:lnTo>
-                <a:lnTo>
-                  <a:pt x="0" y="120000"/>
-                </a:lnTo>
-                <a:close/>
-              </a:path>
-            </a:pathLst>
-          </a:custGeom>
-        </p:spPr>
-      </p:sp>
-      <p:sp>
-        <p:nvSpPr>
-          <p:cNvPr id="59" name="Google Shape;59;g2e8c62c51a3_0_2:notes"/>
-          <p:cNvSpPr txBox="1">
-            <a:spLocks noGrp="1"/>
-          </p:cNvSpPr>
-          <p:nvPr>
-            <p:ph type="body" idx="1"/>
-          </p:nvPr>
-        </p:nvSpPr>
-        <p:spPr>
-          <a:xfrm>
-            <a:off x="685800" y="4343400"/>
-            <a:ext cx="5486400" cy="4114800"/>
-          </a:xfrm>
-          <a:prstGeom prst="rect">
-            <a:avLst/>
-          </a:prstGeom>
-        </p:spPr>
-        <p:txBody>
-          <a:bodyPr spcFirstLastPara="1" wrap="square" lIns="91425" tIns="91425" rIns="91425" bIns="91425" anchor="t" anchorCtr="0">
-            <a:noAutofit/>
-          </a:bodyPr>
-          <a:lstStyle/>
-          <a:p>
-            <a:pPr marL="0" lvl="0" indent="0" algn="l" rtl="0">
-              <a:spcBef>
-                <a:spcPts val="0"/>
-              </a:spcBef>
-              <a:spcAft>
-                <a:spcPts val="0"/>
-              </a:spcAft>
-              <a:buNone/>
-            </a:pPr>
-            <a:endParaRPr/>
-          </a:p>
-        </p:txBody>
-      </p:sp>
-    </p:spTree>
-    <p:extLst>
-      <p:ext uri="{BB962C8B-B14F-4D97-AF65-F5344CB8AC3E}">
-        <p14:creationId xmlns:p14="http://schemas.microsoft.com/office/powerpoint/2010/main" val="1693924299"/>
       </p:ext>
     </p:extLst>
   </p:cSld>
@@ -3355,7 +3493,7 @@
           <a:p>
             <a:fld id="{33444976-0048-7A4B-BDA5-7E235C55B9DD}" type="datetimeFigureOut">
               <a:rPr lang="en-US" smtClean="0"/>
-              <a:t>6/30/2024</a:t>
+              <a:t>7/1/2024</a:t>
             </a:fld>
             <a:endParaRPr lang="en-US"/>
           </a:p>
@@ -10063,7 +10201,7 @@
         </p:nvSpPr>
         <p:spPr>
           <a:xfrm>
-            <a:off x="660306" y="711314"/>
+            <a:off x="1038438" y="711314"/>
             <a:ext cx="4024200" cy="615523"/>
           </a:xfrm>
           <a:prstGeom prst="rect">
@@ -10538,14 +10676,166 @@
         </p:blipFill>
         <p:spPr>
           <a:xfrm>
-            <a:off x="2530475" y="1085850"/>
-            <a:ext cx="4083050" cy="2971800"/>
+            <a:off x="660424" y="1502943"/>
+            <a:ext cx="4145331" cy="2971800"/>
           </a:xfrm>
           <a:prstGeom prst="rect">
             <a:avLst/>
           </a:prstGeom>
         </p:spPr>
       </p:pic>
+      <p:sp>
+        <p:nvSpPr>
+          <p:cNvPr id="2" name="Google Shape;161;p17">
+            <a:extLst>
+              <a:ext uri="{FF2B5EF4-FFF2-40B4-BE49-F238E27FC236}">
+                <a16:creationId xmlns:a16="http://schemas.microsoft.com/office/drawing/2014/main" id="{89AF39AC-6F03-032A-4FED-7C89012646D9}"/>
+              </a:ext>
+            </a:extLst>
+          </p:cNvPr>
+          <p:cNvSpPr txBox="1">
+            <a:spLocks noGrp="1"/>
+          </p:cNvSpPr>
+          <p:nvPr>
+            <p:ph type="body" idx="1"/>
+          </p:nvPr>
+        </p:nvSpPr>
+        <p:spPr>
+          <a:xfrm>
+            <a:off x="5106354" y="1498799"/>
+            <a:ext cx="3403200" cy="3066325"/>
+          </a:xfrm>
+          <a:prstGeom prst="rect">
+            <a:avLst/>
+          </a:prstGeom>
+        </p:spPr>
+        <p:txBody>
+          <a:bodyPr spcFirstLastPara="1" wrap="square" lIns="91425" tIns="91425" rIns="91425" bIns="91425" anchor="t" anchorCtr="0">
+            <a:normAutofit fontScale="92500" lnSpcReduction="10000"/>
+          </a:bodyPr>
+          <a:lstStyle/>
+          <a:p>
+            <a:pPr marL="457200" lvl="0" indent="-311150" algn="l" rtl="0">
+              <a:spcBef>
+                <a:spcPts val="0"/>
+              </a:spcBef>
+              <a:spcAft>
+                <a:spcPts val="0"/>
+              </a:spcAft>
+              <a:buSzPts val="1300"/>
+              <a:buChar char="●"/>
+            </a:pPr>
+            <a:r>
+              <a:rPr lang="en" dirty="0"/>
+              <a:t>N0: If seasons are not related to identity theft, then the Winter months will not see an increase in identity theft.</a:t>
+            </a:r>
+          </a:p>
+          <a:p>
+            <a:pPr marL="457200" lvl="0" indent="-311150" algn="l" rtl="0">
+              <a:spcBef>
+                <a:spcPts val="0"/>
+              </a:spcBef>
+              <a:spcAft>
+                <a:spcPts val="0"/>
+              </a:spcAft>
+              <a:buSzPts val="1300"/>
+              <a:buChar char="●"/>
+            </a:pPr>
+            <a:endParaRPr dirty="0"/>
+          </a:p>
+          <a:p>
+            <a:pPr marL="457200" lvl="0" indent="-311150" algn="l" rtl="0">
+              <a:spcBef>
+                <a:spcPts val="0"/>
+              </a:spcBef>
+              <a:spcAft>
+                <a:spcPts val="0"/>
+              </a:spcAft>
+              <a:buSzPts val="1300"/>
+              <a:buChar char="●"/>
+            </a:pPr>
+            <a:r>
+              <a:rPr lang="en" dirty="0"/>
+              <a:t>N1: If seasons are related to identity theft, then the Winter months will show an increase in identity theft</a:t>
+            </a:r>
+          </a:p>
+          <a:p>
+            <a:pPr marL="0" lvl="0" indent="0" algn="l" rtl="0">
+              <a:spcBef>
+                <a:spcPts val="0"/>
+              </a:spcBef>
+              <a:spcAft>
+                <a:spcPts val="0"/>
+              </a:spcAft>
+              <a:buNone/>
+            </a:pPr>
+            <a:r>
+              <a:rPr lang="en-US" dirty="0"/>
+              <a:t>Results:</a:t>
+            </a:r>
+          </a:p>
+          <a:p>
+            <a:pPr marL="457200" lvl="0" indent="-311150" algn="l" rtl="0">
+              <a:spcBef>
+                <a:spcPts val="1200"/>
+              </a:spcBef>
+              <a:spcAft>
+                <a:spcPts val="0"/>
+              </a:spcAft>
+              <a:buSzPts val="1300"/>
+              <a:buChar char="●"/>
+            </a:pPr>
+            <a:r>
+              <a:rPr lang="en-US" dirty="0"/>
+              <a:t>Chi-squared test: 164.8933382489</a:t>
+            </a:r>
+          </a:p>
+          <a:p>
+            <a:pPr marL="457200" lvl="0" indent="-311150" algn="l" rtl="0">
+              <a:spcBef>
+                <a:spcPts val="0"/>
+              </a:spcBef>
+              <a:spcAft>
+                <a:spcPts val="0"/>
+              </a:spcAft>
+              <a:buSzPts val="1300"/>
+              <a:buChar char="●"/>
+            </a:pPr>
+            <a:r>
+              <a:rPr lang="en-US" dirty="0"/>
+              <a:t>P-value: 1.6107138924223533e-35</a:t>
+            </a:r>
+          </a:p>
+          <a:p>
+            <a:pPr marL="0" lvl="0" indent="0" algn="l" rtl="0">
+              <a:spcBef>
+                <a:spcPts val="1200"/>
+              </a:spcBef>
+              <a:spcAft>
+                <a:spcPts val="1200"/>
+              </a:spcAft>
+              <a:buNone/>
+            </a:pPr>
+            <a:r>
+              <a:rPr lang="en-US" dirty="0"/>
+              <a:t>Reject null hypothesis: Seasons are related to identity theft.</a:t>
+            </a:r>
+          </a:p>
+          <a:p>
+            <a:pPr marL="146050" lvl="0" indent="0" algn="l" rtl="0">
+              <a:spcBef>
+                <a:spcPts val="0"/>
+              </a:spcBef>
+              <a:spcAft>
+                <a:spcPts val="0"/>
+              </a:spcAft>
+              <a:buSzPts val="1300"/>
+              <a:buNone/>
+            </a:pPr>
+            <a:endParaRPr dirty="0"/>
+          </a:p>
+        </p:txBody>
+      </p:sp>
     </p:spTree>
     <p:extLst>
       <p:ext uri="{BB962C8B-B14F-4D97-AF65-F5344CB8AC3E}">
@@ -10564,7 +10854,7 @@
   <p:cSld>
     <p:spTree>
       <p:nvGrpSpPr>
-        <p:cNvPr id="1" name="Shape 159"/>
+        <p:cNvPr id="1" name="Shape 151"/>
         <p:cNvGrpSpPr/>
         <p:nvPr/>
       </p:nvGrpSpPr>
@@ -10578,7 +10868,7 @@
       </p:grpSpPr>
       <p:sp>
         <p:nvSpPr>
-          <p:cNvPr id="160" name="Google Shape;160;p17"/>
+          <p:cNvPr id="152" name="Google Shape;152;p16"/>
           <p:cNvSpPr txBox="1">
             <a:spLocks noGrp="1"/>
           </p:cNvSpPr>
@@ -10596,12 +10886,12 @@
           </a:prstGeom>
         </p:spPr>
         <p:txBody>
-          <a:bodyPr spcFirstLastPara="1" wrap="square" lIns="91425" tIns="91425" rIns="91425" bIns="91425" anchor="t" anchorCtr="0">
+          <a:bodyPr spcFirstLastPara="1" wrap="square" lIns="91425" tIns="91425" rIns="91425" bIns="91425" anchor="ctr" anchorCtr="0">
             <a:normAutofit/>
           </a:bodyPr>
           <a:lstStyle/>
           <a:p>
-            <a:pPr marL="0" lvl="0" indent="0" algn="l" rtl="0">
+            <a:pPr marL="0" lvl="0" indent="0" algn="ctr" rtl="0">
               <a:spcBef>
                 <a:spcPts val="0"/>
               </a:spcBef>
@@ -10612,168 +10902,46 @@
             </a:pPr>
             <a:r>
               <a:rPr lang="en"/>
-              <a:t>Test 1: Identity Theft per Season</a:t>
+              <a:t>Identity Theft per Season</a:t>
             </a:r>
             <a:endParaRPr/>
           </a:p>
         </p:txBody>
       </p:sp>
-      <p:sp>
-        <p:nvSpPr>
-          <p:cNvPr id="161" name="Google Shape;161;p17"/>
-          <p:cNvSpPr txBox="1">
-            <a:spLocks noGrp="1"/>
-          </p:cNvSpPr>
-          <p:nvPr>
-            <p:ph type="body" idx="1"/>
-          </p:nvPr>
-        </p:nvSpPr>
+      <p:pic>
+        <p:nvPicPr>
+          <p:cNvPr id="4" name="Picture 3" descr="A graph showing different colored lines&#10;&#10;Description automatically generated">
+            <a:extLst>
+              <a:ext uri="{FF2B5EF4-FFF2-40B4-BE49-F238E27FC236}">
+                <a16:creationId xmlns:a16="http://schemas.microsoft.com/office/drawing/2014/main" id="{441F922B-D05D-CD3E-F16C-A2CCE882CC46}"/>
+              </a:ext>
+            </a:extLst>
+          </p:cNvPr>
+          <p:cNvPicPr>
+            <a:picLocks noChangeAspect="1"/>
+          </p:cNvPicPr>
+          <p:nvPr/>
+        </p:nvPicPr>
+        <p:blipFill>
+          <a:blip r:embed="rId3"/>
+          <a:stretch>
+            <a:fillRect/>
+          </a:stretch>
+        </p:blipFill>
         <p:spPr>
           <a:xfrm>
-            <a:off x="1297500" y="1567550"/>
-            <a:ext cx="3403200" cy="2911200"/>
+            <a:off x="1552957" y="1307850"/>
+            <a:ext cx="6038086" cy="3230729"/>
           </a:xfrm>
           <a:prstGeom prst="rect">
             <a:avLst/>
           </a:prstGeom>
         </p:spPr>
-        <p:txBody>
-          <a:bodyPr spcFirstLastPara="1" wrap="square" lIns="91425" tIns="91425" rIns="91425" bIns="91425" anchor="t" anchorCtr="0">
-            <a:normAutofit/>
-          </a:bodyPr>
-          <a:lstStyle/>
-          <a:p>
-            <a:pPr marL="457200" lvl="0" indent="-311150" algn="l" rtl="0">
-              <a:spcBef>
-                <a:spcPts val="0"/>
-              </a:spcBef>
-              <a:spcAft>
-                <a:spcPts val="0"/>
-              </a:spcAft>
-              <a:buSzPts val="1300"/>
-              <a:buChar char="●"/>
-            </a:pPr>
-            <a:r>
-              <a:rPr lang="en"/>
-              <a:t>N0: If seasons are not related to identity theft, then the Winter months will not see an increase in identity theft.</a:t>
-            </a:r>
-            <a:endParaRPr/>
-          </a:p>
-          <a:p>
-            <a:pPr marL="457200" lvl="0" indent="-311150" algn="l" rtl="0">
-              <a:spcBef>
-                <a:spcPts val="0"/>
-              </a:spcBef>
-              <a:spcAft>
-                <a:spcPts val="0"/>
-              </a:spcAft>
-              <a:buSzPts val="1300"/>
-              <a:buChar char="●"/>
-            </a:pPr>
-            <a:r>
-              <a:rPr lang="en"/>
-              <a:t>N1: If seasons are related to identity theft, then the Winter months will show an increase in identity theft</a:t>
-            </a:r>
-            <a:endParaRPr/>
-          </a:p>
-        </p:txBody>
-      </p:sp>
-      <p:sp>
-        <p:nvSpPr>
-          <p:cNvPr id="162" name="Google Shape;162;p17"/>
-          <p:cNvSpPr txBox="1">
-            <a:spLocks noGrp="1"/>
-          </p:cNvSpPr>
-          <p:nvPr>
-            <p:ph type="body" idx="2"/>
-          </p:nvPr>
-        </p:nvSpPr>
-        <p:spPr>
-          <a:xfrm>
-            <a:off x="4933221" y="1567550"/>
-            <a:ext cx="3403200" cy="2911200"/>
-          </a:xfrm>
-          <a:prstGeom prst="rect">
-            <a:avLst/>
-          </a:prstGeom>
-        </p:spPr>
-        <p:txBody>
-          <a:bodyPr spcFirstLastPara="1" wrap="square" lIns="91425" tIns="91425" rIns="91425" bIns="91425" anchor="t" anchorCtr="0">
-            <a:normAutofit/>
-          </a:bodyPr>
-          <a:lstStyle/>
-          <a:p>
-            <a:pPr marL="0" lvl="0" indent="0" algn="l" rtl="0">
-              <a:spcBef>
-                <a:spcPts val="0"/>
-              </a:spcBef>
-              <a:spcAft>
-                <a:spcPts val="0"/>
-              </a:spcAft>
-              <a:buNone/>
-            </a:pPr>
-            <a:r>
-              <a:rPr lang="en" dirty="0"/>
-              <a:t>Results:</a:t>
-            </a:r>
-            <a:endParaRPr dirty="0"/>
-          </a:p>
-          <a:p>
-            <a:pPr marL="457200" lvl="0" indent="-311150" algn="l" rtl="0">
-              <a:spcBef>
-                <a:spcPts val="1200"/>
-              </a:spcBef>
-              <a:spcAft>
-                <a:spcPts val="0"/>
-              </a:spcAft>
-              <a:buSzPts val="1300"/>
-              <a:buChar char="●"/>
-            </a:pPr>
-            <a:r>
-              <a:rPr lang="en" dirty="0"/>
-              <a:t>Chi-squared test: 164.8933382489</a:t>
-            </a:r>
-            <a:endParaRPr dirty="0"/>
-          </a:p>
-          <a:p>
-            <a:pPr marL="457200" lvl="0" indent="-311150" algn="l" rtl="0">
-              <a:spcBef>
-                <a:spcPts val="0"/>
-              </a:spcBef>
-              <a:spcAft>
-                <a:spcPts val="0"/>
-              </a:spcAft>
-              <a:buSzPts val="1300"/>
-              <a:buChar char="●"/>
-            </a:pPr>
-            <a:r>
-              <a:rPr lang="en" dirty="0"/>
-              <a:t>P-value: 1.6107138924223533e-35</a:t>
-            </a:r>
-            <a:endParaRPr dirty="0"/>
-          </a:p>
-          <a:p>
-            <a:pPr marL="0" lvl="0" indent="0" algn="l" rtl="0">
-              <a:spcBef>
-                <a:spcPts val="1200"/>
-              </a:spcBef>
-              <a:spcAft>
-                <a:spcPts val="1200"/>
-              </a:spcAft>
-              <a:buNone/>
-            </a:pPr>
-            <a:r>
-              <a:rPr lang="en" dirty="0"/>
-              <a:t>Reject null hypothesis: Seasons are related to identity theft.</a:t>
-            </a:r>
-            <a:endParaRPr dirty="0"/>
-          </a:p>
-        </p:txBody>
-      </p:sp>
+      </p:pic>
     </p:spTree>
     <p:extLst>
       <p:ext uri="{BB962C8B-B14F-4D97-AF65-F5344CB8AC3E}">
-        <p14:creationId xmlns:p14="http://schemas.microsoft.com/office/powerpoint/2010/main" val="1143814766"/>
+        <p14:creationId xmlns:p14="http://schemas.microsoft.com/office/powerpoint/2010/main" val="4014600028"/>
       </p:ext>
     </p:extLst>
   </p:cSld>
@@ -10876,7 +11044,7 @@
               </a:spcAft>
               <a:buNone/>
             </a:pPr>
-            <a:endParaRPr/>
+            <a:endParaRPr dirty="0"/>
           </a:p>
           <a:p>
             <a:pPr marL="457200" lvl="0" indent="-311150" algn="l" rtl="0">
@@ -10890,10 +11058,10 @@
               <a:buChar char="●"/>
             </a:pPr>
             <a:r>
-              <a:rPr lang="en"/>
+              <a:rPr lang="en" sz="1600" dirty="0"/>
               <a:t>Seasons do influence crime in residential burglaries, auto thefts, bicycle thefts, and identity theft.</a:t>
             </a:r>
-            <a:endParaRPr/>
+            <a:endParaRPr sz="1600" dirty="0"/>
           </a:p>
         </p:txBody>
       </p:sp>
@@ -10931,7 +11099,7 @@
               </a:spcAft>
               <a:buNone/>
             </a:pPr>
-            <a:endParaRPr/>
+            <a:endParaRPr dirty="0"/>
           </a:p>
           <a:p>
             <a:pPr marL="457200" lvl="0" indent="-311150" algn="l" rtl="0">
@@ -10945,10 +11113,10 @@
               <a:buChar char="●"/>
             </a:pPr>
             <a:r>
-              <a:rPr lang="en"/>
+              <a:rPr lang="en" sz="1800" dirty="0"/>
               <a:t>Seasons do NOT impact shoplifting incidences</a:t>
             </a:r>
-            <a:endParaRPr/>
+            <a:endParaRPr sz="1800" dirty="0"/>
           </a:p>
           <a:p>
             <a:pPr marL="457200" lvl="0" indent="0" algn="l" rtl="0">
@@ -10960,7 +11128,7 @@
               </a:spcAft>
               <a:buNone/>
             </a:pPr>
-            <a:endParaRPr/>
+            <a:endParaRPr dirty="0"/>
           </a:p>
         </p:txBody>
       </p:sp>
@@ -11044,7 +11212,7 @@
         <p:spPr>
           <a:xfrm>
             <a:off x="1297500" y="1567550"/>
-            <a:ext cx="7038900" cy="2911200"/>
+            <a:ext cx="7038900" cy="3245082"/>
           </a:xfrm>
           <a:prstGeom prst="rect">
             <a:avLst/>
@@ -11066,10 +11234,132 @@
               <a:buNone/>
             </a:pPr>
             <a:r>
-              <a:rPr lang="en"/>
-              <a:t>CSV Source: https://data.austintexas.gov/Public-Safety/Crime-Reports/fdj4-gpfu/about_data</a:t>
+              <a:rPr lang="en" dirty="0"/>
+              <a:t>CSV Source: </a:t>
             </a:r>
-            <a:endParaRPr/>
+            <a:r>
+              <a:rPr lang="en" dirty="0">
+                <a:hlinkClick r:id="rId3"/>
+              </a:rPr>
+              <a:t>https://data.austintexas.gov/Public-Safety/Crime-Reports/fdj4-gpfu/about_data</a:t>
+            </a:r>
+            <a:endParaRPr lang="en" dirty="0"/>
+          </a:p>
+          <a:p>
+            <a:pPr marL="0" lvl="0" indent="0" algn="l" rtl="0">
+              <a:spcBef>
+                <a:spcPts val="0"/>
+              </a:spcBef>
+              <a:spcAft>
+                <a:spcPts val="1200"/>
+              </a:spcAft>
+              <a:buNone/>
+            </a:pPr>
+            <a:r>
+              <a:rPr lang="en-US" dirty="0"/>
+              <a:t>Python Documentation and Tutorials</a:t>
+            </a:r>
+            <a:endParaRPr lang="en" dirty="0"/>
+          </a:p>
+          <a:p>
+            <a:pPr marL="0" lvl="0" indent="0" algn="l" rtl="0">
+              <a:spcBef>
+                <a:spcPts val="0"/>
+              </a:spcBef>
+              <a:spcAft>
+                <a:spcPts val="1200"/>
+              </a:spcAft>
+              <a:buNone/>
+            </a:pPr>
+            <a:r>
+              <a:rPr lang="en-US" dirty="0"/>
+              <a:t>Python Libraries and Packages</a:t>
+            </a:r>
+            <a:endParaRPr lang="en" dirty="0"/>
+          </a:p>
+          <a:p>
+            <a:pPr marL="0" lvl="0" indent="0" algn="l" rtl="0">
+              <a:spcBef>
+                <a:spcPts val="0"/>
+              </a:spcBef>
+              <a:spcAft>
+                <a:spcPts val="1200"/>
+              </a:spcAft>
+              <a:buNone/>
+            </a:pPr>
+            <a:r>
+              <a:rPr lang="en-US" dirty="0"/>
+              <a:t>Development Tools</a:t>
+            </a:r>
+            <a:r>
+              <a:rPr lang="en" dirty="0"/>
+              <a:t>: Visual Studio Code</a:t>
+            </a:r>
+          </a:p>
+          <a:p>
+            <a:pPr marL="0" lvl="0" indent="0" algn="l" rtl="0">
+              <a:spcBef>
+                <a:spcPts val="0"/>
+              </a:spcBef>
+              <a:spcAft>
+                <a:spcPts val="1200"/>
+              </a:spcAft>
+              <a:buNone/>
+            </a:pPr>
+            <a:r>
+              <a:rPr lang="en-US" dirty="0"/>
+              <a:t>Version Control</a:t>
+            </a:r>
+            <a:r>
+              <a:rPr lang="en" dirty="0"/>
+              <a:t>: Git and Github</a:t>
+            </a:r>
+          </a:p>
+          <a:p>
+            <a:pPr marL="0" lvl="0" indent="0" algn="l" rtl="0">
+              <a:spcBef>
+                <a:spcPts val="0"/>
+              </a:spcBef>
+              <a:spcAft>
+                <a:spcPts val="1200"/>
+              </a:spcAft>
+              <a:buNone/>
+            </a:pPr>
+            <a:r>
+              <a:rPr lang="en" dirty="0"/>
+              <a:t>Collaboration and Communication: Slack and Zoom</a:t>
+            </a:r>
+          </a:p>
+          <a:p>
+            <a:pPr marL="0" lvl="0" indent="0" algn="l" rtl="0">
+              <a:spcBef>
+                <a:spcPts val="0"/>
+              </a:spcBef>
+              <a:spcAft>
+                <a:spcPts val="1200"/>
+              </a:spcAft>
+              <a:buNone/>
+            </a:pPr>
+            <a:r>
+              <a:rPr lang="en" dirty="0"/>
+              <a:t>Instructional Staff: Travis Hopkins (Instructor) </a:t>
+            </a:r>
+          </a:p>
+          <a:p>
+            <a:pPr marL="0" lvl="0" indent="0" algn="l" rtl="0">
+              <a:spcBef>
+                <a:spcPts val="0"/>
+              </a:spcBef>
+              <a:spcAft>
+                <a:spcPts val="1200"/>
+              </a:spcAft>
+              <a:buNone/>
+            </a:pPr>
+            <a:r>
+              <a:rPr lang="en-US" dirty="0"/>
+              <a:t>                                 Kian Layson (TA)      </a:t>
+            </a:r>
+            <a:endParaRPr dirty="0"/>
           </a:p>
         </p:txBody>
       </p:sp>
@@ -11126,6 +11416,7 @@
           </a:bodyPr>
           <a:lstStyle/>
           <a:p>
+            <a:pPr algn="ctr"/>
             <a:r>
               <a:rPr lang="en-US" dirty="0"/>
               <a:t>Basic Analysis</a:t>
@@ -11148,15 +11439,15 @@
           <p:nvPr/>
         </p:nvPicPr>
         <p:blipFill>
-          <a:blip r:embed="rId2"/>
+          <a:blip r:embed="rId3"/>
           <a:stretch>
             <a:fillRect/>
           </a:stretch>
         </p:blipFill>
         <p:spPr>
           <a:xfrm>
-            <a:off x="380100" y="1268016"/>
-            <a:ext cx="4191901" cy="3367871"/>
+            <a:off x="553157" y="1407859"/>
+            <a:ext cx="3612615" cy="2698966"/>
           </a:xfrm>
           <a:prstGeom prst="rect">
             <a:avLst/>
@@ -11178,15 +11469,15 @@
           <p:nvPr/>
         </p:nvPicPr>
         <p:blipFill>
-          <a:blip r:embed="rId3"/>
+          <a:blip r:embed="rId4"/>
           <a:stretch>
             <a:fillRect/>
           </a:stretch>
         </p:blipFill>
         <p:spPr>
           <a:xfrm>
-            <a:off x="4670853" y="1268017"/>
-            <a:ext cx="4004233" cy="3131747"/>
+            <a:off x="4682003" y="1405998"/>
+            <a:ext cx="3612615" cy="2687478"/>
           </a:xfrm>
           <a:prstGeom prst="rect">
             <a:avLst/>
@@ -11207,7 +11498,7 @@
         </p:nvSpPr>
         <p:spPr>
           <a:xfrm>
-            <a:off x="7358449" y="507613"/>
+            <a:off x="7083441" y="200461"/>
             <a:ext cx="1405451" cy="900246"/>
           </a:xfrm>
           <a:prstGeom prst="rect">
@@ -11242,7 +11533,7 @@
         </p:nvSpPr>
         <p:spPr>
           <a:xfrm>
-            <a:off x="3512409" y="593124"/>
+            <a:off x="1635483" y="362043"/>
             <a:ext cx="1306727" cy="738664"/>
           </a:xfrm>
           <a:prstGeom prst="rect">
@@ -11815,13 +12106,13 @@
           <a:p>
             <a:r>
               <a:rPr lang="en-US" dirty="0"/>
-              <a:t>ALL TIME LOW IN THE WINTER</a:t>
+              <a:t>All Time Low In The Winter</a:t>
             </a:r>
           </a:p>
           <a:p>
             <a:r>
               <a:rPr lang="en-US" dirty="0"/>
-              <a:t>ALL TIME HIGH IN THE SUMMER</a:t>
+              <a:t>All Time High In The Summer</a:t>
             </a:r>
           </a:p>
         </p:txBody>

</xml_diff>